<commit_message>
week 15: fix typos, update slides
</commit_message>
<xml_diff>
--- a/week_15/week_15.pptx
+++ b/week_15/week_15.pptx
@@ -206,7 +206,7 @@
           <a:p>
             <a:fld id="{A756DEA0-F944-5946-9B95-BC7B5255CD05}" type="datetimeFigureOut">
               <a:rPr lang="en-US" smtClean="0"/>
-              <a:t>5/4/16</a:t>
+              <a:t>12/5/16</a:t>
             </a:fld>
             <a:endParaRPr lang="en-US"/>
           </a:p>
@@ -518,7 +518,7 @@
           <a:bodyPr/>
           <a:lstStyle/>
           <a:p>
-            <a:endParaRPr lang="en-US" dirty="0"/>
+            <a:endParaRPr lang="en-US"/>
           </a:p>
         </p:txBody>
       </p:sp>
@@ -539,7 +539,7 @@
           <a:p>
             <a:fld id="{0FF3EE0D-70A9-3744-80A0-179DFFBD3C67}" type="slidenum">
               <a:rPr lang="en-US" smtClean="0"/>
-              <a:t>4</a:t>
+              <a:t>1</a:t>
             </a:fld>
             <a:endParaRPr lang="en-US"/>
           </a:p>
@@ -548,7 +548,7 @@
     </p:spTree>
     <p:extLst>
       <p:ext uri="{BB962C8B-B14F-4D97-AF65-F5344CB8AC3E}">
-        <p14:creationId xmlns:p14="http://schemas.microsoft.com/office/powerpoint/2010/main" val="700590728"/>
+        <p14:creationId xmlns:p14="http://schemas.microsoft.com/office/powerpoint/2010/main" val="1703656260"/>
       </p:ext>
     </p:extLst>
   </p:cSld>
@@ -623,7 +623,7 @@
           <a:p>
             <a:fld id="{0FF3EE0D-70A9-3744-80A0-179DFFBD3C67}" type="slidenum">
               <a:rPr lang="en-US" smtClean="0"/>
-              <a:t>5</a:t>
+              <a:t>4</a:t>
             </a:fld>
             <a:endParaRPr lang="en-US"/>
           </a:p>
@@ -632,7 +632,7 @@
     </p:spTree>
     <p:extLst>
       <p:ext uri="{BB962C8B-B14F-4D97-AF65-F5344CB8AC3E}">
-        <p14:creationId xmlns:p14="http://schemas.microsoft.com/office/powerpoint/2010/main" val="747311826"/>
+        <p14:creationId xmlns:p14="http://schemas.microsoft.com/office/powerpoint/2010/main" val="700590728"/>
       </p:ext>
     </p:extLst>
   </p:cSld>
@@ -707,7 +707,7 @@
           <a:p>
             <a:fld id="{0FF3EE0D-70A9-3744-80A0-179DFFBD3C67}" type="slidenum">
               <a:rPr lang="en-US" smtClean="0"/>
-              <a:t>6</a:t>
+              <a:t>5</a:t>
             </a:fld>
             <a:endParaRPr lang="en-US"/>
           </a:p>
@@ -716,7 +716,7 @@
     </p:spTree>
     <p:extLst>
       <p:ext uri="{BB962C8B-B14F-4D97-AF65-F5344CB8AC3E}">
-        <p14:creationId xmlns:p14="http://schemas.microsoft.com/office/powerpoint/2010/main" val="164822693"/>
+        <p14:creationId xmlns:p14="http://schemas.microsoft.com/office/powerpoint/2010/main" val="747311826"/>
       </p:ext>
     </p:extLst>
   </p:cSld>
@@ -791,7 +791,7 @@
           <a:p>
             <a:fld id="{0FF3EE0D-70A9-3744-80A0-179DFFBD3C67}" type="slidenum">
               <a:rPr lang="en-US" smtClean="0"/>
-              <a:t>7</a:t>
+              <a:t>6</a:t>
             </a:fld>
             <a:endParaRPr lang="en-US"/>
           </a:p>
@@ -800,7 +800,7 @@
     </p:spTree>
     <p:extLst>
       <p:ext uri="{BB962C8B-B14F-4D97-AF65-F5344CB8AC3E}">
-        <p14:creationId xmlns:p14="http://schemas.microsoft.com/office/powerpoint/2010/main" val="2010875460"/>
+        <p14:creationId xmlns:p14="http://schemas.microsoft.com/office/powerpoint/2010/main" val="164822693"/>
       </p:ext>
     </p:extLst>
   </p:cSld>
@@ -875,6 +875,90 @@
           <a:p>
             <a:fld id="{0FF3EE0D-70A9-3744-80A0-179DFFBD3C67}" type="slidenum">
               <a:rPr lang="en-US" smtClean="0"/>
+              <a:t>7</a:t>
+            </a:fld>
+            <a:endParaRPr lang="en-US"/>
+          </a:p>
+        </p:txBody>
+      </p:sp>
+    </p:spTree>
+    <p:extLst>
+      <p:ext uri="{BB962C8B-B14F-4D97-AF65-F5344CB8AC3E}">
+        <p14:creationId xmlns:p14="http://schemas.microsoft.com/office/powerpoint/2010/main" val="2010875460"/>
+      </p:ext>
+    </p:extLst>
+  </p:cSld>
+  <p:clrMapOvr>
+    <a:masterClrMapping/>
+  </p:clrMapOvr>
+</p:notes>
+</file>
+
+<file path=ppt/notesSlides/notesSlide6.xml><?xml version="1.0" encoding="utf-8"?>
+<p:notes xmlns:a="http://schemas.openxmlformats.org/drawingml/2006/main" xmlns:r="http://schemas.openxmlformats.org/officeDocument/2006/relationships" xmlns:p="http://schemas.openxmlformats.org/presentationml/2006/main">
+  <p:cSld>
+    <p:spTree>
+      <p:nvGrpSpPr>
+        <p:cNvPr id="1" name=""/>
+        <p:cNvGrpSpPr/>
+        <p:nvPr/>
+      </p:nvGrpSpPr>
+      <p:grpSpPr>
+        <a:xfrm>
+          <a:off x="0" y="0"/>
+          <a:ext cx="0" cy="0"/>
+          <a:chOff x="0" y="0"/>
+          <a:chExt cx="0" cy="0"/>
+        </a:xfrm>
+      </p:grpSpPr>
+      <p:sp>
+        <p:nvSpPr>
+          <p:cNvPr id="2" name="Slide Image Placeholder 1"/>
+          <p:cNvSpPr>
+            <a:spLocks noGrp="1" noRot="1" noChangeAspect="1"/>
+          </p:cNvSpPr>
+          <p:nvPr>
+            <p:ph type="sldImg"/>
+          </p:nvPr>
+        </p:nvSpPr>
+        <p:spPr/>
+      </p:sp>
+      <p:sp>
+        <p:nvSpPr>
+          <p:cNvPr id="3" name="Notes Placeholder 2"/>
+          <p:cNvSpPr>
+            <a:spLocks noGrp="1"/>
+          </p:cNvSpPr>
+          <p:nvPr>
+            <p:ph type="body" idx="1"/>
+          </p:nvPr>
+        </p:nvSpPr>
+        <p:spPr/>
+        <p:txBody>
+          <a:bodyPr/>
+          <a:lstStyle/>
+          <a:p>
+            <a:endParaRPr lang="en-US" dirty="0"/>
+          </a:p>
+        </p:txBody>
+      </p:sp>
+      <p:sp>
+        <p:nvSpPr>
+          <p:cNvPr id="4" name="Slide Number Placeholder 3"/>
+          <p:cNvSpPr>
+            <a:spLocks noGrp="1"/>
+          </p:cNvSpPr>
+          <p:nvPr>
+            <p:ph type="sldNum" sz="quarter" idx="10"/>
+          </p:nvPr>
+        </p:nvSpPr>
+        <p:spPr/>
+        <p:txBody>
+          <a:bodyPr/>
+          <a:lstStyle/>
+          <a:p>
+            <a:fld id="{0FF3EE0D-70A9-3744-80A0-179DFFBD3C67}" type="slidenum">
+              <a:rPr lang="en-US" smtClean="0"/>
               <a:t>8</a:t>
             </a:fld>
             <a:endParaRPr lang="en-US"/>
@@ -894,7 +978,7 @@
 </p:notes>
 </file>
 
-<file path=ppt/notesSlides/notesSlide6.xml><?xml version="1.0" encoding="utf-8"?>
+<file path=ppt/notesSlides/notesSlide7.xml><?xml version="1.0" encoding="utf-8"?>
 <p:notes xmlns:a="http://schemas.openxmlformats.org/drawingml/2006/main" xmlns:r="http://schemas.openxmlformats.org/officeDocument/2006/relationships" xmlns:p="http://schemas.openxmlformats.org/presentationml/2006/main">
   <p:cSld>
     <p:spTree>
@@ -1144,9 +1228,9 @@
             </a:lvl1pPr>
           </a:lstStyle>
           <a:p>
-            <a:fld id="{9E016143-E03C-4CFD-AFDC-14E5BDEA754C}" type="datetimeFigureOut">
-              <a:rPr lang="en-US" dirty="0"/>
-              <a:t>5/4/16</a:t>
+            <a:fld id="{38D2A2A4-0AA7-4040-A7A8-52F49F985E75}" type="datetime1">
+              <a:rPr lang="en-US" smtClean="0"/>
+              <a:t>12/5/16</a:t>
             </a:fld>
             <a:endParaRPr lang="en-US" dirty="0"/>
           </a:p>
@@ -1368,9 +1452,9 @@
           <a:bodyPr/>
           <a:lstStyle/>
           <a:p>
-            <a:fld id="{C033E54A-A8CA-48C1-9504-691B58049D29}" type="datetimeFigureOut">
-              <a:rPr lang="en-US" dirty="0"/>
-              <a:t>5/4/16</a:t>
+            <a:fld id="{19D656B0-084F-9545-97D6-A2FFD7A9B577}" type="datetime1">
+              <a:rPr lang="en-US" smtClean="0"/>
+              <a:t>12/5/16</a:t>
             </a:fld>
             <a:endParaRPr lang="en-US" dirty="0"/>
           </a:p>
@@ -1543,9 +1627,9 @@
           <a:bodyPr/>
           <a:lstStyle/>
           <a:p>
-            <a:fld id="{B5F6C806-BBF7-471C-9527-881CE2266695}" type="datetimeFigureOut">
-              <a:rPr lang="en-US" dirty="0"/>
-              <a:t>5/4/16</a:t>
+            <a:fld id="{605E3B3E-DB11-EF49-AC4F-49CD47CDD952}" type="datetime1">
+              <a:rPr lang="en-US" smtClean="0"/>
+              <a:t>12/5/16</a:t>
             </a:fld>
             <a:endParaRPr lang="en-US" dirty="0"/>
           </a:p>
@@ -1708,9 +1792,9 @@
           <a:bodyPr/>
           <a:lstStyle/>
           <a:p>
-            <a:fld id="{78C94063-DF36-4330-A365-08DA1FA5B7D6}" type="datetimeFigureOut">
-              <a:rPr lang="en-US" dirty="0"/>
-              <a:t>5/4/16</a:t>
+            <a:fld id="{95EDAB77-6AD6-8647-9BBB-4B05E17AF77C}" type="datetime1">
+              <a:rPr lang="en-US" smtClean="0"/>
+              <a:t>12/5/16</a:t>
             </a:fld>
             <a:endParaRPr lang="en-US" dirty="0"/>
           </a:p>
@@ -1957,9 +2041,9 @@
           <a:bodyPr/>
           <a:lstStyle/>
           <a:p>
-            <a:fld id="{908A7C6C-0F39-4D70-8E8D-FE5B9C95FA73}" type="datetimeFigureOut">
-              <a:rPr lang="en-US" dirty="0"/>
-              <a:t>5/4/16</a:t>
+            <a:fld id="{29DD9A70-C8DD-A54C-A415-8C4E969BEAEE}" type="datetime1">
+              <a:rPr lang="en-US" smtClean="0"/>
+              <a:t>12/5/16</a:t>
             </a:fld>
             <a:endParaRPr lang="en-US" dirty="0"/>
           </a:p>
@@ -2278,9 +2362,9 @@
           <a:bodyPr/>
           <a:lstStyle/>
           <a:p>
-            <a:fld id="{DFCFA4AC-08CC-42CE-BD01-C191750A04EC}" type="datetimeFigureOut">
-              <a:rPr lang="en-US" dirty="0"/>
-              <a:t>5/4/16</a:t>
+            <a:fld id="{5BFE55D5-EF8E-EC41-B5EA-FE13323895E8}" type="datetime1">
+              <a:rPr lang="en-US" smtClean="0"/>
+              <a:t>12/5/16</a:t>
             </a:fld>
             <a:endParaRPr lang="en-US" dirty="0"/>
           </a:p>
@@ -2724,9 +2808,9 @@
           <a:bodyPr/>
           <a:lstStyle/>
           <a:p>
-            <a:fld id="{1BA7A723-92A7-435B-B681-F25B092FEFEB}" type="datetimeFigureOut">
-              <a:rPr lang="en-US" dirty="0"/>
-              <a:t>5/4/16</a:t>
+            <a:fld id="{86884163-8E3F-9442-94F8-7B3CC652A117}" type="datetime1">
+              <a:rPr lang="en-US" smtClean="0"/>
+              <a:t>12/5/16</a:t>
             </a:fld>
             <a:endParaRPr lang="en-US" dirty="0"/>
           </a:p>
@@ -2837,9 +2921,9 @@
           <a:bodyPr/>
           <a:lstStyle/>
           <a:p>
-            <a:fld id="{4F170639-886C-4FCF-9EAB-ABB5DA3F3F4A}" type="datetimeFigureOut">
-              <a:rPr lang="en-US" dirty="0"/>
-              <a:t>5/4/16</a:t>
+            <a:fld id="{0D2C72CD-F651-6146-BA08-DFE10F8EB08B}" type="datetime1">
+              <a:rPr lang="en-US" smtClean="0"/>
+              <a:t>12/5/16</a:t>
             </a:fld>
             <a:endParaRPr lang="en-US" dirty="0"/>
           </a:p>
@@ -2927,9 +3011,9 @@
           <a:bodyPr/>
           <a:lstStyle/>
           <a:p>
-            <a:fld id="{22230651-31F4-45D2-98AE-A2108F41BC07}" type="datetimeFigureOut">
-              <a:rPr lang="en-US" dirty="0"/>
-              <a:t>5/4/16</a:t>
+            <a:fld id="{BCF6EAD1-D1FD-7444-A26E-70245DCCEA2E}" type="datetime1">
+              <a:rPr lang="en-US" smtClean="0"/>
+              <a:t>12/5/16</a:t>
             </a:fld>
             <a:endParaRPr lang="en-US" dirty="0"/>
           </a:p>
@@ -3209,9 +3293,9 @@
           <a:bodyPr/>
           <a:lstStyle/>
           <a:p>
-            <a:fld id="{6F53789A-C914-4DB1-8815-80B5EC7335C5}" type="datetimeFigureOut">
-              <a:rPr lang="en-US" dirty="0"/>
-              <a:t>5/4/16</a:t>
+            <a:fld id="{6BBE9735-101C-7545-9C10-ED04DD1F385B}" type="datetime1">
+              <a:rPr lang="en-US" smtClean="0"/>
+              <a:t>12/5/16</a:t>
             </a:fld>
             <a:endParaRPr lang="en-US" dirty="0"/>
           </a:p>
@@ -3529,9 +3613,9 @@
           <a:bodyPr/>
           <a:lstStyle/>
           <a:p>
-            <a:fld id="{5E6440AA-91A0-436F-8FDB-C0F939DCAE21}" type="datetimeFigureOut">
-              <a:rPr lang="en-US" dirty="0"/>
-              <a:t>5/4/16</a:t>
+            <a:fld id="{370BDD6C-C769-4E4A-97F4-558B3C3F12A0}" type="datetime1">
+              <a:rPr lang="en-US" smtClean="0"/>
+              <a:t>12/5/16</a:t>
             </a:fld>
             <a:endParaRPr lang="en-US" dirty="0"/>
           </a:p>
@@ -3778,9 +3862,9 @@
             </a:lvl1pPr>
           </a:lstStyle>
           <a:p>
-            <a:fld id="{0E59FD0C-5451-4CA0-86AF-E70AE3279989}" type="datetimeFigureOut">
-              <a:rPr lang="en-US" dirty="0"/>
-              <a:t>5/4/16</a:t>
+            <a:fld id="{A7FCEA12-A827-9948-8B20-37E38721C675}" type="datetime1">
+              <a:rPr lang="en-US" smtClean="0"/>
+              <a:t>12/5/16</a:t>
             </a:fld>
             <a:endParaRPr lang="en-US" dirty="0"/>
           </a:p>
@@ -3885,7 +3969,7 @@
     <p:sldLayoutId id="2147483850" r:id="rId10"/>
     <p:sldLayoutId id="2147483851" r:id="rId11"/>
   </p:sldLayoutIdLst>
-  <p:hf sldNum="0" hdr="0" ftr="0" dt="0"/>
+  <p:hf hdr="0" ftr="0" dt="0"/>
   <p:txStyles>
     <p:titleStyle>
       <a:lvl1pPr algn="l" defTabSz="914400" rtl="0" eaLnBrk="1" latinLnBrk="0" hangingPunct="1">
@@ -4305,14 +4389,46 @@
           <a:p>
             <a:r>
               <a:rPr lang="en-US" dirty="0" smtClean="0"/>
-              <a:t>Week 14: HTTP and Networking</a:t>
-            </a:r>
-          </a:p>
-          <a:p>
+              <a:t>Week </a:t>
+            </a:r>
             <a:r>
               <a:rPr lang="en-US" dirty="0" smtClean="0"/>
-              <a:t>May 5, 2016</a:t>
-            </a:r>
+              <a:t>15: </a:t>
+            </a:r>
+            <a:r>
+              <a:rPr lang="en-US" dirty="0" smtClean="0"/>
+              <a:t>HTTP and </a:t>
+            </a:r>
+            <a:r>
+              <a:rPr lang="en-US" dirty="0" smtClean="0"/>
+              <a:t>Networking</a:t>
+            </a:r>
+            <a:endParaRPr lang="en-US" dirty="0" smtClean="0"/>
+          </a:p>
+        </p:txBody>
+      </p:sp>
+      <p:sp>
+        <p:nvSpPr>
+          <p:cNvPr id="4" name="Slide Number Placeholder 3"/>
+          <p:cNvSpPr>
+            <a:spLocks noGrp="1"/>
+          </p:cNvSpPr>
+          <p:nvPr>
+            <p:ph type="sldNum" sz="quarter" idx="12"/>
+          </p:nvPr>
+        </p:nvSpPr>
+        <p:spPr/>
+        <p:txBody>
+          <a:bodyPr>
+            <a:normAutofit lnSpcReduction="10000"/>
+          </a:bodyPr>
+          <a:lstStyle/>
+          <a:p>
+            <a:fld id="{4FAB73BC-B049-4115-A692-8D63A059BFB8}" type="slidenum">
+              <a:rPr lang="en-US" smtClean="0"/>
+              <a:pPr/>
+              <a:t>1</a:t>
+            </a:fld>
             <a:endParaRPr lang="en-US" dirty="0"/>
           </a:p>
         </p:txBody>
@@ -4607,6 +4723,29 @@
           </a:p>
         </p:txBody>
       </p:sp>
+      <p:sp>
+        <p:nvSpPr>
+          <p:cNvPr id="4" name="Slide Number Placeholder 3"/>
+          <p:cNvSpPr>
+            <a:spLocks noGrp="1"/>
+          </p:cNvSpPr>
+          <p:nvPr>
+            <p:ph type="sldNum" sz="quarter" idx="12"/>
+          </p:nvPr>
+        </p:nvSpPr>
+        <p:spPr/>
+        <p:txBody>
+          <a:bodyPr/>
+          <a:lstStyle/>
+          <a:p>
+            <a:fld id="{4FAB73BC-B049-4115-A692-8D63A059BFB8}" type="slidenum">
+              <a:rPr lang="en-US" smtClean="0"/>
+              <a:t>10</a:t>
+            </a:fld>
+            <a:endParaRPr lang="en-US" dirty="0"/>
+          </a:p>
+        </p:txBody>
+      </p:sp>
     </p:spTree>
     <p:extLst>
       <p:ext uri="{BB962C8B-B14F-4D97-AF65-F5344CB8AC3E}">
@@ -4693,6 +4832,31 @@
           </a:p>
         </p:txBody>
       </p:sp>
+      <p:sp>
+        <p:nvSpPr>
+          <p:cNvPr id="4" name="Slide Number Placeholder 3"/>
+          <p:cNvSpPr>
+            <a:spLocks noGrp="1"/>
+          </p:cNvSpPr>
+          <p:nvPr>
+            <p:ph type="sldNum" sz="quarter" idx="12"/>
+          </p:nvPr>
+        </p:nvSpPr>
+        <p:spPr/>
+        <p:txBody>
+          <a:bodyPr>
+            <a:normAutofit lnSpcReduction="10000"/>
+          </a:bodyPr>
+          <a:lstStyle/>
+          <a:p>
+            <a:fld id="{4FAB73BC-B049-4115-A692-8D63A059BFB8}" type="slidenum">
+              <a:rPr lang="en-US" smtClean="0"/>
+              <a:t>2</a:t>
+            </a:fld>
+            <a:endParaRPr lang="en-US" dirty="0"/>
+          </a:p>
+        </p:txBody>
+      </p:sp>
     </p:spTree>
     <p:extLst>
       <p:ext uri="{BB962C8B-B14F-4D97-AF65-F5344CB8AC3E}">
@@ -4765,6 +4929,29 @@
           </a:p>
         </p:txBody>
       </p:sp>
+      <p:sp>
+        <p:nvSpPr>
+          <p:cNvPr id="2" name="Slide Number Placeholder 1"/>
+          <p:cNvSpPr>
+            <a:spLocks noGrp="1"/>
+          </p:cNvSpPr>
+          <p:nvPr>
+            <p:ph type="sldNum" sz="quarter" idx="12"/>
+          </p:nvPr>
+        </p:nvSpPr>
+        <p:spPr/>
+        <p:txBody>
+          <a:bodyPr/>
+          <a:lstStyle/>
+          <a:p>
+            <a:fld id="{4FAB73BC-B049-4115-A692-8D63A059BFB8}" type="slidenum">
+              <a:rPr lang="en-US" smtClean="0"/>
+              <a:t>3</a:t>
+            </a:fld>
+            <a:endParaRPr lang="en-US" dirty="0"/>
+          </a:p>
+        </p:txBody>
+      </p:sp>
     </p:spTree>
     <p:extLst>
       <p:ext uri="{BB962C8B-B14F-4D97-AF65-F5344CB8AC3E}">
@@ -4859,6 +5046,29 @@
           </a:p>
         </p:txBody>
       </p:sp>
+      <p:sp>
+        <p:nvSpPr>
+          <p:cNvPr id="4" name="Slide Number Placeholder 3"/>
+          <p:cNvSpPr>
+            <a:spLocks noGrp="1"/>
+          </p:cNvSpPr>
+          <p:nvPr>
+            <p:ph type="sldNum" sz="quarter" idx="12"/>
+          </p:nvPr>
+        </p:nvSpPr>
+        <p:spPr/>
+        <p:txBody>
+          <a:bodyPr/>
+          <a:lstStyle/>
+          <a:p>
+            <a:fld id="{4FAB73BC-B049-4115-A692-8D63A059BFB8}" type="slidenum">
+              <a:rPr lang="en-US" smtClean="0"/>
+              <a:t>4</a:t>
+            </a:fld>
+            <a:endParaRPr lang="en-US" dirty="0"/>
+          </a:p>
+        </p:txBody>
+      </p:sp>
     </p:spTree>
     <p:extLst>
       <p:ext uri="{BB962C8B-B14F-4D97-AF65-F5344CB8AC3E}">
@@ -5011,6 +5221,29 @@
           </a:p>
         </p:txBody>
       </p:sp>
+      <p:sp>
+        <p:nvSpPr>
+          <p:cNvPr id="4" name="Slide Number Placeholder 3"/>
+          <p:cNvSpPr>
+            <a:spLocks noGrp="1"/>
+          </p:cNvSpPr>
+          <p:nvPr>
+            <p:ph type="sldNum" sz="quarter" idx="12"/>
+          </p:nvPr>
+        </p:nvSpPr>
+        <p:spPr/>
+        <p:txBody>
+          <a:bodyPr/>
+          <a:lstStyle/>
+          <a:p>
+            <a:fld id="{4FAB73BC-B049-4115-A692-8D63A059BFB8}" type="slidenum">
+              <a:rPr lang="en-US" smtClean="0"/>
+              <a:t>5</a:t>
+            </a:fld>
+            <a:endParaRPr lang="en-US" dirty="0"/>
+          </a:p>
+        </p:txBody>
+      </p:sp>
     </p:spTree>
     <p:extLst>
       <p:ext uri="{BB962C8B-B14F-4D97-AF65-F5344CB8AC3E}">
@@ -5135,6 +5368,29 @@
           </a:p>
         </p:txBody>
       </p:sp>
+      <p:sp>
+        <p:nvSpPr>
+          <p:cNvPr id="4" name="Slide Number Placeholder 3"/>
+          <p:cNvSpPr>
+            <a:spLocks noGrp="1"/>
+          </p:cNvSpPr>
+          <p:nvPr>
+            <p:ph type="sldNum" sz="quarter" idx="12"/>
+          </p:nvPr>
+        </p:nvSpPr>
+        <p:spPr/>
+        <p:txBody>
+          <a:bodyPr/>
+          <a:lstStyle/>
+          <a:p>
+            <a:fld id="{4FAB73BC-B049-4115-A692-8D63A059BFB8}" type="slidenum">
+              <a:rPr lang="en-US" smtClean="0"/>
+              <a:t>6</a:t>
+            </a:fld>
+            <a:endParaRPr lang="en-US" dirty="0"/>
+          </a:p>
+        </p:txBody>
+      </p:sp>
     </p:spTree>
     <p:extLst>
       <p:ext uri="{BB962C8B-B14F-4D97-AF65-F5344CB8AC3E}">
@@ -5231,6 +5487,29 @@
           </a:p>
         </p:txBody>
       </p:sp>
+      <p:sp>
+        <p:nvSpPr>
+          <p:cNvPr id="4" name="Slide Number Placeholder 3"/>
+          <p:cNvSpPr>
+            <a:spLocks noGrp="1"/>
+          </p:cNvSpPr>
+          <p:nvPr>
+            <p:ph type="sldNum" sz="quarter" idx="12"/>
+          </p:nvPr>
+        </p:nvSpPr>
+        <p:spPr/>
+        <p:txBody>
+          <a:bodyPr/>
+          <a:lstStyle/>
+          <a:p>
+            <a:fld id="{4FAB73BC-B049-4115-A692-8D63A059BFB8}" type="slidenum">
+              <a:rPr lang="en-US" smtClean="0"/>
+              <a:t>7</a:t>
+            </a:fld>
+            <a:endParaRPr lang="en-US" dirty="0"/>
+          </a:p>
+        </p:txBody>
+      </p:sp>
     </p:spTree>
     <p:extLst>
       <p:ext uri="{BB962C8B-B14F-4D97-AF65-F5344CB8AC3E}">
@@ -5371,6 +5650,29 @@
           </a:p>
         </p:txBody>
       </p:sp>
+      <p:sp>
+        <p:nvSpPr>
+          <p:cNvPr id="4" name="Slide Number Placeholder 3"/>
+          <p:cNvSpPr>
+            <a:spLocks noGrp="1"/>
+          </p:cNvSpPr>
+          <p:nvPr>
+            <p:ph type="sldNum" sz="quarter" idx="12"/>
+          </p:nvPr>
+        </p:nvSpPr>
+        <p:spPr/>
+        <p:txBody>
+          <a:bodyPr/>
+          <a:lstStyle/>
+          <a:p>
+            <a:fld id="{4FAB73BC-B049-4115-A692-8D63A059BFB8}" type="slidenum">
+              <a:rPr lang="en-US" smtClean="0"/>
+              <a:t>8</a:t>
+            </a:fld>
+            <a:endParaRPr lang="en-US" dirty="0"/>
+          </a:p>
+        </p:txBody>
+      </p:sp>
     </p:spTree>
     <p:extLst>
       <p:ext uri="{BB962C8B-B14F-4D97-AF65-F5344CB8AC3E}">
@@ -5490,6 +5792,29 @@
               <a:t> library</a:t>
             </a:r>
             <a:endParaRPr lang="en-US" sz="3200" dirty="0"/>
+          </a:p>
+        </p:txBody>
+      </p:sp>
+      <p:sp>
+        <p:nvSpPr>
+          <p:cNvPr id="4" name="Slide Number Placeholder 3"/>
+          <p:cNvSpPr>
+            <a:spLocks noGrp="1"/>
+          </p:cNvSpPr>
+          <p:nvPr>
+            <p:ph type="sldNum" sz="quarter" idx="12"/>
+          </p:nvPr>
+        </p:nvSpPr>
+        <p:spPr/>
+        <p:txBody>
+          <a:bodyPr/>
+          <a:lstStyle/>
+          <a:p>
+            <a:fld id="{4FAB73BC-B049-4115-A692-8D63A059BFB8}" type="slidenum">
+              <a:rPr lang="en-US" smtClean="0"/>
+              <a:t>9</a:t>
+            </a:fld>
+            <a:endParaRPr lang="en-US" dirty="0"/>
           </a:p>
         </p:txBody>
       </p:sp>

</xml_diff>

<commit_message>
week 15: typo in slides
</commit_message>
<xml_diff>
--- a/week_15/week_15.pptx
+++ b/week_15/week_15.pptx
@@ -206,7 +206,7 @@
           <a:p>
             <a:fld id="{A756DEA0-F944-5946-9B95-BC7B5255CD05}" type="datetimeFigureOut">
               <a:rPr lang="en-US" smtClean="0"/>
-              <a:t>12/5/16</a:t>
+              <a:t>5/2/17</a:t>
             </a:fld>
             <a:endParaRPr lang="en-US"/>
           </a:p>
@@ -1230,7 +1230,7 @@
           <a:p>
             <a:fld id="{38D2A2A4-0AA7-4040-A7A8-52F49F985E75}" type="datetime1">
               <a:rPr lang="en-US" smtClean="0"/>
-              <a:t>12/5/16</a:t>
+              <a:t>5/2/17</a:t>
             </a:fld>
             <a:endParaRPr lang="en-US" dirty="0"/>
           </a:p>
@@ -1454,7 +1454,7 @@
           <a:p>
             <a:fld id="{19D656B0-084F-9545-97D6-A2FFD7A9B577}" type="datetime1">
               <a:rPr lang="en-US" smtClean="0"/>
-              <a:t>12/5/16</a:t>
+              <a:t>5/2/17</a:t>
             </a:fld>
             <a:endParaRPr lang="en-US" dirty="0"/>
           </a:p>
@@ -1629,7 +1629,7 @@
           <a:p>
             <a:fld id="{605E3B3E-DB11-EF49-AC4F-49CD47CDD952}" type="datetime1">
               <a:rPr lang="en-US" smtClean="0"/>
-              <a:t>12/5/16</a:t>
+              <a:t>5/2/17</a:t>
             </a:fld>
             <a:endParaRPr lang="en-US" dirty="0"/>
           </a:p>
@@ -1794,7 +1794,7 @@
           <a:p>
             <a:fld id="{95EDAB77-6AD6-8647-9BBB-4B05E17AF77C}" type="datetime1">
               <a:rPr lang="en-US" smtClean="0"/>
-              <a:t>12/5/16</a:t>
+              <a:t>5/2/17</a:t>
             </a:fld>
             <a:endParaRPr lang="en-US" dirty="0"/>
           </a:p>
@@ -2043,7 +2043,7 @@
           <a:p>
             <a:fld id="{29DD9A70-C8DD-A54C-A415-8C4E969BEAEE}" type="datetime1">
               <a:rPr lang="en-US" smtClean="0"/>
-              <a:t>12/5/16</a:t>
+              <a:t>5/2/17</a:t>
             </a:fld>
             <a:endParaRPr lang="en-US" dirty="0"/>
           </a:p>
@@ -2364,7 +2364,7 @@
           <a:p>
             <a:fld id="{5BFE55D5-EF8E-EC41-B5EA-FE13323895E8}" type="datetime1">
               <a:rPr lang="en-US" smtClean="0"/>
-              <a:t>12/5/16</a:t>
+              <a:t>5/2/17</a:t>
             </a:fld>
             <a:endParaRPr lang="en-US" dirty="0"/>
           </a:p>
@@ -2810,7 +2810,7 @@
           <a:p>
             <a:fld id="{86884163-8E3F-9442-94F8-7B3CC652A117}" type="datetime1">
               <a:rPr lang="en-US" smtClean="0"/>
-              <a:t>12/5/16</a:t>
+              <a:t>5/2/17</a:t>
             </a:fld>
             <a:endParaRPr lang="en-US" dirty="0"/>
           </a:p>
@@ -2923,7 +2923,7 @@
           <a:p>
             <a:fld id="{0D2C72CD-F651-6146-BA08-DFE10F8EB08B}" type="datetime1">
               <a:rPr lang="en-US" smtClean="0"/>
-              <a:t>12/5/16</a:t>
+              <a:t>5/2/17</a:t>
             </a:fld>
             <a:endParaRPr lang="en-US" dirty="0"/>
           </a:p>
@@ -3013,7 +3013,7 @@
           <a:p>
             <a:fld id="{BCF6EAD1-D1FD-7444-A26E-70245DCCEA2E}" type="datetime1">
               <a:rPr lang="en-US" smtClean="0"/>
-              <a:t>12/5/16</a:t>
+              <a:t>5/2/17</a:t>
             </a:fld>
             <a:endParaRPr lang="en-US" dirty="0"/>
           </a:p>
@@ -3295,7 +3295,7 @@
           <a:p>
             <a:fld id="{6BBE9735-101C-7545-9C10-ED04DD1F385B}" type="datetime1">
               <a:rPr lang="en-US" smtClean="0"/>
-              <a:t>12/5/16</a:t>
+              <a:t>5/2/17</a:t>
             </a:fld>
             <a:endParaRPr lang="en-US" dirty="0"/>
           </a:p>
@@ -3615,7 +3615,7 @@
           <a:p>
             <a:fld id="{370BDD6C-C769-4E4A-97F4-558B3C3F12A0}" type="datetime1">
               <a:rPr lang="en-US" smtClean="0"/>
-              <a:t>12/5/16</a:t>
+              <a:t>5/2/17</a:t>
             </a:fld>
             <a:endParaRPr lang="en-US" dirty="0"/>
           </a:p>
@@ -3864,7 +3864,7 @@
           <a:p>
             <a:fld id="{A7FCEA12-A827-9948-8B20-37E38721C675}" type="datetime1">
               <a:rPr lang="en-US" smtClean="0"/>
-              <a:t>12/5/16</a:t>
+              <a:t>5/2/17</a:t>
             </a:fld>
             <a:endParaRPr lang="en-US" dirty="0"/>
           </a:p>
@@ -4389,21 +4389,8 @@
           <a:p>
             <a:r>
               <a:rPr lang="en-US" dirty="0" smtClean="0"/>
-              <a:t>Week </a:t>
-            </a:r>
-            <a:r>
-              <a:rPr lang="en-US" dirty="0" smtClean="0"/>
-              <a:t>15: </a:t>
-            </a:r>
-            <a:r>
-              <a:rPr lang="en-US" dirty="0" smtClean="0"/>
-              <a:t>HTTP and </a:t>
-            </a:r>
-            <a:r>
-              <a:rPr lang="en-US" dirty="0" smtClean="0"/>
-              <a:t>Networking</a:t>
-            </a:r>
-            <a:endParaRPr lang="en-US" dirty="0" smtClean="0"/>
+              <a:t>Week 15: HTTP and Networking</a:t>
+            </a:r>
           </a:p>
         </p:txBody>
       </p:sp>
@@ -4735,7 +4722,9 @@
         </p:nvSpPr>
         <p:spPr/>
         <p:txBody>
-          <a:bodyPr/>
+          <a:bodyPr>
+            <a:normAutofit lnSpcReduction="10000"/>
+          </a:bodyPr>
           <a:lstStyle/>
           <a:p>
             <a:fld id="{4FAB73BC-B049-4115-A692-8D63A059BFB8}" type="slidenum">
@@ -4941,7 +4930,9 @@
         </p:nvSpPr>
         <p:spPr/>
         <p:txBody>
-          <a:bodyPr/>
+          <a:bodyPr>
+            <a:normAutofit lnSpcReduction="10000"/>
+          </a:bodyPr>
           <a:lstStyle/>
           <a:p>
             <a:fld id="{4FAB73BC-B049-4115-A692-8D63A059BFB8}" type="slidenum">
@@ -5033,8 +5024,8 @@
               <a:t>Based on requests and </a:t>
             </a:r>
             <a:r>
-              <a:rPr lang="en-US" sz="3000" dirty="0" err="1" smtClean="0"/>
-              <a:t>repsonses</a:t>
+              <a:rPr lang="en-US" sz="3000" dirty="0" smtClean="0"/>
+              <a:t>responses</a:t>
             </a:r>
             <a:endParaRPr lang="en-US" sz="3000" dirty="0" smtClean="0"/>
           </a:p>
@@ -5058,7 +5049,9 @@
         </p:nvSpPr>
         <p:spPr/>
         <p:txBody>
-          <a:bodyPr/>
+          <a:bodyPr>
+            <a:normAutofit lnSpcReduction="10000"/>
+          </a:bodyPr>
           <a:lstStyle/>
           <a:p>
             <a:fld id="{4FAB73BC-B049-4115-A692-8D63A059BFB8}" type="slidenum">
@@ -5233,7 +5226,9 @@
         </p:nvSpPr>
         <p:spPr/>
         <p:txBody>
-          <a:bodyPr/>
+          <a:bodyPr>
+            <a:normAutofit lnSpcReduction="10000"/>
+          </a:bodyPr>
           <a:lstStyle/>
           <a:p>
             <a:fld id="{4FAB73BC-B049-4115-A692-8D63A059BFB8}" type="slidenum">
@@ -5380,7 +5375,9 @@
         </p:nvSpPr>
         <p:spPr/>
         <p:txBody>
-          <a:bodyPr/>
+          <a:bodyPr>
+            <a:normAutofit lnSpcReduction="10000"/>
+          </a:bodyPr>
           <a:lstStyle/>
           <a:p>
             <a:fld id="{4FAB73BC-B049-4115-A692-8D63A059BFB8}" type="slidenum">
@@ -5499,7 +5496,9 @@
         </p:nvSpPr>
         <p:spPr/>
         <p:txBody>
-          <a:bodyPr/>
+          <a:bodyPr>
+            <a:normAutofit lnSpcReduction="10000"/>
+          </a:bodyPr>
           <a:lstStyle/>
           <a:p>
             <a:fld id="{4FAB73BC-B049-4115-A692-8D63A059BFB8}" type="slidenum">
@@ -5662,7 +5661,9 @@
         </p:nvSpPr>
         <p:spPr/>
         <p:txBody>
-          <a:bodyPr/>
+          <a:bodyPr>
+            <a:normAutofit lnSpcReduction="10000"/>
+          </a:bodyPr>
           <a:lstStyle/>
           <a:p>
             <a:fld id="{4FAB73BC-B049-4115-A692-8D63A059BFB8}" type="slidenum">
@@ -5807,7 +5808,9 @@
         </p:nvSpPr>
         <p:spPr/>
         <p:txBody>
-          <a:bodyPr/>
+          <a:bodyPr>
+            <a:normAutofit lnSpcReduction="10000"/>
+          </a:bodyPr>
           <a:lstStyle/>
           <a:p>
             <a:fld id="{4FAB73BC-B049-4115-A692-8D63A059BFB8}" type="slidenum">

</xml_diff>